<commit_message>
Add SpringBoot study into pptx
</commit_message>
<xml_diff>
--- a/JavaStudy/SpringBoot/SpringBoot.pptx
+++ b/JavaStudy/SpringBoot/SpringBoot.pptx
@@ -106,6 +106,11 @@
       </a:defRPr>
     </a:lvl9pPr>
   </p:defaultTextStyle>
+  <p:extLst>
+    <p:ext uri="{EFAFB233-063F-42B5-8137-9DF3F51BA10A}">
+      <p15:sldGuideLst xmlns:p15="http://schemas.microsoft.com/office/powerpoint/2012/main"/>
+    </p:ext>
+  </p:extLst>
 </p:presentation>
 </file>
 
@@ -151,10 +156,9 @@
           </a:lstStyle>
           <a:p>
             <a:r>
-              <a:rPr lang="zh-CN" altLang="en-US" smtClean="0"/>
+              <a:rPr lang="zh-CN" altLang="en-US"/>
               <a:t>单击此处编辑母版标题样式</a:t>
             </a:r>
-            <a:endParaRPr lang="zh-CN" altLang="en-US"/>
           </a:p>
         </p:txBody>
       </p:sp>
@@ -216,10 +220,9 @@
           </a:lstStyle>
           <a:p>
             <a:r>
-              <a:rPr lang="zh-CN" altLang="en-US" smtClean="0"/>
+              <a:rPr lang="zh-CN" altLang="en-US"/>
               <a:t>单击以编辑母版副标题样式</a:t>
             </a:r>
-            <a:endParaRPr lang="zh-CN" altLang="en-US"/>
           </a:p>
         </p:txBody>
       </p:sp>
@@ -240,7 +243,7 @@
           <a:p>
             <a:fld id="{ED707C5D-1D82-470D-8483-AF30F5141E46}" type="datetimeFigureOut">
               <a:rPr lang="zh-CN" altLang="en-US" smtClean="0"/>
-              <a:t>2023/3/15</a:t>
+              <a:t>2023/3/16</a:t>
             </a:fld>
             <a:endParaRPr lang="zh-CN" altLang="en-US"/>
           </a:p>
@@ -334,10 +337,9 @@
           <a:lstStyle/>
           <a:p>
             <a:r>
-              <a:rPr lang="zh-CN" altLang="en-US" smtClean="0"/>
+              <a:rPr lang="zh-CN" altLang="en-US"/>
               <a:t>单击此处编辑母版标题样式</a:t>
             </a:r>
-            <a:endParaRPr lang="zh-CN" altLang="en-US"/>
           </a:p>
         </p:txBody>
       </p:sp>
@@ -358,38 +360,37 @@
           <a:p>
             <a:pPr lvl="0"/>
             <a:r>
-              <a:rPr lang="zh-CN" altLang="en-US" smtClean="0"/>
+              <a:rPr lang="zh-CN" altLang="en-US"/>
               <a:t>编辑母版文本样式</a:t>
             </a:r>
           </a:p>
           <a:p>
             <a:pPr lvl="1"/>
             <a:r>
-              <a:rPr lang="zh-CN" altLang="en-US" smtClean="0"/>
+              <a:rPr lang="zh-CN" altLang="en-US"/>
               <a:t>第二级</a:t>
             </a:r>
           </a:p>
           <a:p>
             <a:pPr lvl="2"/>
             <a:r>
-              <a:rPr lang="zh-CN" altLang="en-US" smtClean="0"/>
+              <a:rPr lang="zh-CN" altLang="en-US"/>
               <a:t>第三级</a:t>
             </a:r>
           </a:p>
           <a:p>
             <a:pPr lvl="3"/>
             <a:r>
-              <a:rPr lang="zh-CN" altLang="en-US" smtClean="0"/>
+              <a:rPr lang="zh-CN" altLang="en-US"/>
               <a:t>第四级</a:t>
             </a:r>
           </a:p>
           <a:p>
             <a:pPr lvl="4"/>
             <a:r>
-              <a:rPr lang="zh-CN" altLang="en-US" smtClean="0"/>
+              <a:rPr lang="zh-CN" altLang="en-US"/>
               <a:t>第五级</a:t>
             </a:r>
-            <a:endParaRPr lang="zh-CN" altLang="en-US"/>
           </a:p>
         </p:txBody>
       </p:sp>
@@ -410,7 +411,7 @@
           <a:p>
             <a:fld id="{ED707C5D-1D82-470D-8483-AF30F5141E46}" type="datetimeFigureOut">
               <a:rPr lang="zh-CN" altLang="en-US" smtClean="0"/>
-              <a:t>2023/3/15</a:t>
+              <a:t>2023/3/16</a:t>
             </a:fld>
             <a:endParaRPr lang="zh-CN" altLang="en-US"/>
           </a:p>
@@ -509,10 +510,9 @@
           <a:lstStyle/>
           <a:p>
             <a:r>
-              <a:rPr lang="zh-CN" altLang="en-US" smtClean="0"/>
+              <a:rPr lang="zh-CN" altLang="en-US"/>
               <a:t>单击此处编辑母版标题样式</a:t>
             </a:r>
-            <a:endParaRPr lang="zh-CN" altLang="en-US"/>
           </a:p>
         </p:txBody>
       </p:sp>
@@ -538,38 +538,37 @@
           <a:p>
             <a:pPr lvl="0"/>
             <a:r>
-              <a:rPr lang="zh-CN" altLang="en-US" smtClean="0"/>
+              <a:rPr lang="zh-CN" altLang="en-US"/>
               <a:t>编辑母版文本样式</a:t>
             </a:r>
           </a:p>
           <a:p>
             <a:pPr lvl="1"/>
             <a:r>
-              <a:rPr lang="zh-CN" altLang="en-US" smtClean="0"/>
+              <a:rPr lang="zh-CN" altLang="en-US"/>
               <a:t>第二级</a:t>
             </a:r>
           </a:p>
           <a:p>
             <a:pPr lvl="2"/>
             <a:r>
-              <a:rPr lang="zh-CN" altLang="en-US" smtClean="0"/>
+              <a:rPr lang="zh-CN" altLang="en-US"/>
               <a:t>第三级</a:t>
             </a:r>
           </a:p>
           <a:p>
             <a:pPr lvl="3"/>
             <a:r>
-              <a:rPr lang="zh-CN" altLang="en-US" smtClean="0"/>
+              <a:rPr lang="zh-CN" altLang="en-US"/>
               <a:t>第四级</a:t>
             </a:r>
           </a:p>
           <a:p>
             <a:pPr lvl="4"/>
             <a:r>
-              <a:rPr lang="zh-CN" altLang="en-US" smtClean="0"/>
+              <a:rPr lang="zh-CN" altLang="en-US"/>
               <a:t>第五级</a:t>
             </a:r>
-            <a:endParaRPr lang="zh-CN" altLang="en-US"/>
           </a:p>
         </p:txBody>
       </p:sp>
@@ -590,7 +589,7 @@
           <a:p>
             <a:fld id="{ED707C5D-1D82-470D-8483-AF30F5141E46}" type="datetimeFigureOut">
               <a:rPr lang="zh-CN" altLang="en-US" smtClean="0"/>
-              <a:t>2023/3/15</a:t>
+              <a:t>2023/3/16</a:t>
             </a:fld>
             <a:endParaRPr lang="zh-CN" altLang="en-US"/>
           </a:p>
@@ -684,10 +683,9 @@
           <a:lstStyle/>
           <a:p>
             <a:r>
-              <a:rPr lang="zh-CN" altLang="en-US" smtClean="0"/>
+              <a:rPr lang="zh-CN" altLang="en-US"/>
               <a:t>单击此处编辑母版标题样式</a:t>
             </a:r>
-            <a:endParaRPr lang="zh-CN" altLang="en-US"/>
           </a:p>
         </p:txBody>
       </p:sp>
@@ -708,38 +706,37 @@
           <a:p>
             <a:pPr lvl="0"/>
             <a:r>
-              <a:rPr lang="zh-CN" altLang="en-US" smtClean="0"/>
+              <a:rPr lang="zh-CN" altLang="en-US"/>
               <a:t>编辑母版文本样式</a:t>
             </a:r>
           </a:p>
           <a:p>
             <a:pPr lvl="1"/>
             <a:r>
-              <a:rPr lang="zh-CN" altLang="en-US" smtClean="0"/>
+              <a:rPr lang="zh-CN" altLang="en-US"/>
               <a:t>第二级</a:t>
             </a:r>
           </a:p>
           <a:p>
             <a:pPr lvl="2"/>
             <a:r>
-              <a:rPr lang="zh-CN" altLang="en-US" smtClean="0"/>
+              <a:rPr lang="zh-CN" altLang="en-US"/>
               <a:t>第三级</a:t>
             </a:r>
           </a:p>
           <a:p>
             <a:pPr lvl="3"/>
             <a:r>
-              <a:rPr lang="zh-CN" altLang="en-US" smtClean="0"/>
+              <a:rPr lang="zh-CN" altLang="en-US"/>
               <a:t>第四级</a:t>
             </a:r>
           </a:p>
           <a:p>
             <a:pPr lvl="4"/>
             <a:r>
-              <a:rPr lang="zh-CN" altLang="en-US" smtClean="0"/>
+              <a:rPr lang="zh-CN" altLang="en-US"/>
               <a:t>第五级</a:t>
             </a:r>
-            <a:endParaRPr lang="zh-CN" altLang="en-US"/>
           </a:p>
         </p:txBody>
       </p:sp>
@@ -760,7 +757,7 @@
           <a:p>
             <a:fld id="{ED707C5D-1D82-470D-8483-AF30F5141E46}" type="datetimeFigureOut">
               <a:rPr lang="zh-CN" altLang="en-US" smtClean="0"/>
-              <a:t>2023/3/15</a:t>
+              <a:t>2023/3/16</a:t>
             </a:fld>
             <a:endParaRPr lang="zh-CN" altLang="en-US"/>
           </a:p>
@@ -863,10 +860,9 @@
           </a:lstStyle>
           <a:p>
             <a:r>
-              <a:rPr lang="zh-CN" altLang="en-US" smtClean="0"/>
+              <a:rPr lang="zh-CN" altLang="en-US"/>
               <a:t>单击此处编辑母版标题样式</a:t>
             </a:r>
-            <a:endParaRPr lang="zh-CN" altLang="en-US"/>
           </a:p>
         </p:txBody>
       </p:sp>
@@ -983,7 +979,7 @@
           <a:p>
             <a:pPr lvl="0"/>
             <a:r>
-              <a:rPr lang="zh-CN" altLang="en-US" smtClean="0"/>
+              <a:rPr lang="zh-CN" altLang="en-US"/>
               <a:t>编辑母版文本样式</a:t>
             </a:r>
           </a:p>
@@ -1006,7 +1002,7 @@
           <a:p>
             <a:fld id="{ED707C5D-1D82-470D-8483-AF30F5141E46}" type="datetimeFigureOut">
               <a:rPr lang="zh-CN" altLang="en-US" smtClean="0"/>
-              <a:t>2023/3/15</a:t>
+              <a:t>2023/3/16</a:t>
             </a:fld>
             <a:endParaRPr lang="zh-CN" altLang="en-US"/>
           </a:p>
@@ -1100,10 +1096,9 @@
           <a:lstStyle/>
           <a:p>
             <a:r>
-              <a:rPr lang="zh-CN" altLang="en-US" smtClean="0"/>
+              <a:rPr lang="zh-CN" altLang="en-US"/>
               <a:t>单击此处编辑母版标题样式</a:t>
             </a:r>
-            <a:endParaRPr lang="zh-CN" altLang="en-US"/>
           </a:p>
         </p:txBody>
       </p:sp>
@@ -1129,38 +1124,37 @@
           <a:p>
             <a:pPr lvl="0"/>
             <a:r>
-              <a:rPr lang="zh-CN" altLang="en-US" smtClean="0"/>
+              <a:rPr lang="zh-CN" altLang="en-US"/>
               <a:t>编辑母版文本样式</a:t>
             </a:r>
           </a:p>
           <a:p>
             <a:pPr lvl="1"/>
             <a:r>
-              <a:rPr lang="zh-CN" altLang="en-US" smtClean="0"/>
+              <a:rPr lang="zh-CN" altLang="en-US"/>
               <a:t>第二级</a:t>
             </a:r>
           </a:p>
           <a:p>
             <a:pPr lvl="2"/>
             <a:r>
-              <a:rPr lang="zh-CN" altLang="en-US" smtClean="0"/>
+              <a:rPr lang="zh-CN" altLang="en-US"/>
               <a:t>第三级</a:t>
             </a:r>
           </a:p>
           <a:p>
             <a:pPr lvl="3"/>
             <a:r>
-              <a:rPr lang="zh-CN" altLang="en-US" smtClean="0"/>
+              <a:rPr lang="zh-CN" altLang="en-US"/>
               <a:t>第四级</a:t>
             </a:r>
           </a:p>
           <a:p>
             <a:pPr lvl="4"/>
             <a:r>
-              <a:rPr lang="zh-CN" altLang="en-US" smtClean="0"/>
+              <a:rPr lang="zh-CN" altLang="en-US"/>
               <a:t>第五级</a:t>
             </a:r>
-            <a:endParaRPr lang="zh-CN" altLang="en-US"/>
           </a:p>
         </p:txBody>
       </p:sp>
@@ -1186,38 +1180,37 @@
           <a:p>
             <a:pPr lvl="0"/>
             <a:r>
-              <a:rPr lang="zh-CN" altLang="en-US" smtClean="0"/>
+              <a:rPr lang="zh-CN" altLang="en-US"/>
               <a:t>编辑母版文本样式</a:t>
             </a:r>
           </a:p>
           <a:p>
             <a:pPr lvl="1"/>
             <a:r>
-              <a:rPr lang="zh-CN" altLang="en-US" smtClean="0"/>
+              <a:rPr lang="zh-CN" altLang="en-US"/>
               <a:t>第二级</a:t>
             </a:r>
           </a:p>
           <a:p>
             <a:pPr lvl="2"/>
             <a:r>
-              <a:rPr lang="zh-CN" altLang="en-US" smtClean="0"/>
+              <a:rPr lang="zh-CN" altLang="en-US"/>
               <a:t>第三级</a:t>
             </a:r>
           </a:p>
           <a:p>
             <a:pPr lvl="3"/>
             <a:r>
-              <a:rPr lang="zh-CN" altLang="en-US" smtClean="0"/>
+              <a:rPr lang="zh-CN" altLang="en-US"/>
               <a:t>第四级</a:t>
             </a:r>
           </a:p>
           <a:p>
             <a:pPr lvl="4"/>
             <a:r>
-              <a:rPr lang="zh-CN" altLang="en-US" smtClean="0"/>
+              <a:rPr lang="zh-CN" altLang="en-US"/>
               <a:t>第五级</a:t>
             </a:r>
-            <a:endParaRPr lang="zh-CN" altLang="en-US"/>
           </a:p>
         </p:txBody>
       </p:sp>
@@ -1238,7 +1231,7 @@
           <a:p>
             <a:fld id="{ED707C5D-1D82-470D-8483-AF30F5141E46}" type="datetimeFigureOut">
               <a:rPr lang="zh-CN" altLang="en-US" smtClean="0"/>
-              <a:t>2023/3/15</a:t>
+              <a:t>2023/3/16</a:t>
             </a:fld>
             <a:endParaRPr lang="zh-CN" altLang="en-US"/>
           </a:p>
@@ -1337,10 +1330,9 @@
           <a:lstStyle/>
           <a:p>
             <a:r>
-              <a:rPr lang="zh-CN" altLang="en-US" smtClean="0"/>
+              <a:rPr lang="zh-CN" altLang="en-US"/>
               <a:t>单击此处编辑母版标题样式</a:t>
             </a:r>
-            <a:endParaRPr lang="zh-CN" altLang="en-US"/>
           </a:p>
         </p:txBody>
       </p:sp>
@@ -1403,7 +1395,7 @@
           <a:p>
             <a:pPr lvl="0"/>
             <a:r>
-              <a:rPr lang="zh-CN" altLang="en-US" smtClean="0"/>
+              <a:rPr lang="zh-CN" altLang="en-US"/>
               <a:t>编辑母版文本样式</a:t>
             </a:r>
           </a:p>
@@ -1431,38 +1423,37 @@
           <a:p>
             <a:pPr lvl="0"/>
             <a:r>
-              <a:rPr lang="zh-CN" altLang="en-US" smtClean="0"/>
+              <a:rPr lang="zh-CN" altLang="en-US"/>
               <a:t>编辑母版文本样式</a:t>
             </a:r>
           </a:p>
           <a:p>
             <a:pPr lvl="1"/>
             <a:r>
-              <a:rPr lang="zh-CN" altLang="en-US" smtClean="0"/>
+              <a:rPr lang="zh-CN" altLang="en-US"/>
               <a:t>第二级</a:t>
             </a:r>
           </a:p>
           <a:p>
             <a:pPr lvl="2"/>
             <a:r>
-              <a:rPr lang="zh-CN" altLang="en-US" smtClean="0"/>
+              <a:rPr lang="zh-CN" altLang="en-US"/>
               <a:t>第三级</a:t>
             </a:r>
           </a:p>
           <a:p>
             <a:pPr lvl="3"/>
             <a:r>
-              <a:rPr lang="zh-CN" altLang="en-US" smtClean="0"/>
+              <a:rPr lang="zh-CN" altLang="en-US"/>
               <a:t>第四级</a:t>
             </a:r>
           </a:p>
           <a:p>
             <a:pPr lvl="4"/>
             <a:r>
-              <a:rPr lang="zh-CN" altLang="en-US" smtClean="0"/>
+              <a:rPr lang="zh-CN" altLang="en-US"/>
               <a:t>第五级</a:t>
             </a:r>
-            <a:endParaRPr lang="zh-CN" altLang="en-US"/>
           </a:p>
         </p:txBody>
       </p:sp>
@@ -1525,7 +1516,7 @@
           <a:p>
             <a:pPr lvl="0"/>
             <a:r>
-              <a:rPr lang="zh-CN" altLang="en-US" smtClean="0"/>
+              <a:rPr lang="zh-CN" altLang="en-US"/>
               <a:t>编辑母版文本样式</a:t>
             </a:r>
           </a:p>
@@ -1553,38 +1544,37 @@
           <a:p>
             <a:pPr lvl="0"/>
             <a:r>
-              <a:rPr lang="zh-CN" altLang="en-US" smtClean="0"/>
+              <a:rPr lang="zh-CN" altLang="en-US"/>
               <a:t>编辑母版文本样式</a:t>
             </a:r>
           </a:p>
           <a:p>
             <a:pPr lvl="1"/>
             <a:r>
-              <a:rPr lang="zh-CN" altLang="en-US" smtClean="0"/>
+              <a:rPr lang="zh-CN" altLang="en-US"/>
               <a:t>第二级</a:t>
             </a:r>
           </a:p>
           <a:p>
             <a:pPr lvl="2"/>
             <a:r>
-              <a:rPr lang="zh-CN" altLang="en-US" smtClean="0"/>
+              <a:rPr lang="zh-CN" altLang="en-US"/>
               <a:t>第三级</a:t>
             </a:r>
           </a:p>
           <a:p>
             <a:pPr lvl="3"/>
             <a:r>
-              <a:rPr lang="zh-CN" altLang="en-US" smtClean="0"/>
+              <a:rPr lang="zh-CN" altLang="en-US"/>
               <a:t>第四级</a:t>
             </a:r>
           </a:p>
           <a:p>
             <a:pPr lvl="4"/>
             <a:r>
-              <a:rPr lang="zh-CN" altLang="en-US" smtClean="0"/>
+              <a:rPr lang="zh-CN" altLang="en-US"/>
               <a:t>第五级</a:t>
             </a:r>
-            <a:endParaRPr lang="zh-CN" altLang="en-US"/>
           </a:p>
         </p:txBody>
       </p:sp>
@@ -1605,7 +1595,7 @@
           <a:p>
             <a:fld id="{ED707C5D-1D82-470D-8483-AF30F5141E46}" type="datetimeFigureOut">
               <a:rPr lang="zh-CN" altLang="en-US" smtClean="0"/>
-              <a:t>2023/3/15</a:t>
+              <a:t>2023/3/16</a:t>
             </a:fld>
             <a:endParaRPr lang="zh-CN" altLang="en-US"/>
           </a:p>
@@ -1699,10 +1689,9 @@
           <a:lstStyle/>
           <a:p>
             <a:r>
-              <a:rPr lang="zh-CN" altLang="en-US" smtClean="0"/>
+              <a:rPr lang="zh-CN" altLang="en-US"/>
               <a:t>单击此处编辑母版标题样式</a:t>
             </a:r>
-            <a:endParaRPr lang="zh-CN" altLang="en-US"/>
           </a:p>
         </p:txBody>
       </p:sp>
@@ -1723,7 +1712,7 @@
           <a:p>
             <a:fld id="{ED707C5D-1D82-470D-8483-AF30F5141E46}" type="datetimeFigureOut">
               <a:rPr lang="zh-CN" altLang="en-US" smtClean="0"/>
-              <a:t>2023/3/15</a:t>
+              <a:t>2023/3/16</a:t>
             </a:fld>
             <a:endParaRPr lang="zh-CN" altLang="en-US"/>
           </a:p>
@@ -1818,7 +1807,7 @@
           <a:p>
             <a:fld id="{ED707C5D-1D82-470D-8483-AF30F5141E46}" type="datetimeFigureOut">
               <a:rPr lang="zh-CN" altLang="en-US" smtClean="0"/>
-              <a:t>2023/3/15</a:t>
+              <a:t>2023/3/16</a:t>
             </a:fld>
             <a:endParaRPr lang="zh-CN" altLang="en-US"/>
           </a:p>
@@ -1921,10 +1910,9 @@
           </a:lstStyle>
           <a:p>
             <a:r>
-              <a:rPr lang="zh-CN" altLang="en-US" smtClean="0"/>
+              <a:rPr lang="zh-CN" altLang="en-US"/>
               <a:t>单击此处编辑母版标题样式</a:t>
             </a:r>
-            <a:endParaRPr lang="zh-CN" altLang="en-US"/>
           </a:p>
         </p:txBody>
       </p:sp>
@@ -1978,38 +1966,37 @@
           <a:p>
             <a:pPr lvl="0"/>
             <a:r>
-              <a:rPr lang="zh-CN" altLang="en-US" smtClean="0"/>
+              <a:rPr lang="zh-CN" altLang="en-US"/>
               <a:t>编辑母版文本样式</a:t>
             </a:r>
           </a:p>
           <a:p>
             <a:pPr lvl="1"/>
             <a:r>
-              <a:rPr lang="zh-CN" altLang="en-US" smtClean="0"/>
+              <a:rPr lang="zh-CN" altLang="en-US"/>
               <a:t>第二级</a:t>
             </a:r>
           </a:p>
           <a:p>
             <a:pPr lvl="2"/>
             <a:r>
-              <a:rPr lang="zh-CN" altLang="en-US" smtClean="0"/>
+              <a:rPr lang="zh-CN" altLang="en-US"/>
               <a:t>第三级</a:t>
             </a:r>
           </a:p>
           <a:p>
             <a:pPr lvl="3"/>
             <a:r>
-              <a:rPr lang="zh-CN" altLang="en-US" smtClean="0"/>
+              <a:rPr lang="zh-CN" altLang="en-US"/>
               <a:t>第四级</a:t>
             </a:r>
           </a:p>
           <a:p>
             <a:pPr lvl="4"/>
             <a:r>
-              <a:rPr lang="zh-CN" altLang="en-US" smtClean="0"/>
+              <a:rPr lang="zh-CN" altLang="en-US"/>
               <a:t>第五级</a:t>
             </a:r>
-            <a:endParaRPr lang="zh-CN" altLang="en-US"/>
           </a:p>
         </p:txBody>
       </p:sp>
@@ -2072,7 +2059,7 @@
           <a:p>
             <a:pPr lvl="0"/>
             <a:r>
-              <a:rPr lang="zh-CN" altLang="en-US" smtClean="0"/>
+              <a:rPr lang="zh-CN" altLang="en-US"/>
               <a:t>编辑母版文本样式</a:t>
             </a:r>
           </a:p>
@@ -2095,7 +2082,7 @@
           <a:p>
             <a:fld id="{ED707C5D-1D82-470D-8483-AF30F5141E46}" type="datetimeFigureOut">
               <a:rPr lang="zh-CN" altLang="en-US" smtClean="0"/>
-              <a:t>2023/3/15</a:t>
+              <a:t>2023/3/16</a:t>
             </a:fld>
             <a:endParaRPr lang="zh-CN" altLang="en-US"/>
           </a:p>
@@ -2198,10 +2185,9 @@
           </a:lstStyle>
           <a:p>
             <a:r>
-              <a:rPr lang="zh-CN" altLang="en-US" smtClean="0"/>
+              <a:rPr lang="zh-CN" altLang="en-US"/>
               <a:t>单击此处编辑母版标题样式</a:t>
             </a:r>
-            <a:endParaRPr lang="zh-CN" altLang="en-US"/>
           </a:p>
         </p:txBody>
       </p:sp>
@@ -2325,7 +2311,7 @@
           <a:p>
             <a:pPr lvl="0"/>
             <a:r>
-              <a:rPr lang="zh-CN" altLang="en-US" smtClean="0"/>
+              <a:rPr lang="zh-CN" altLang="en-US"/>
               <a:t>编辑母版文本样式</a:t>
             </a:r>
           </a:p>
@@ -2348,7 +2334,7 @@
           <a:p>
             <a:fld id="{ED707C5D-1D82-470D-8483-AF30F5141E46}" type="datetimeFigureOut">
               <a:rPr lang="zh-CN" altLang="en-US" smtClean="0"/>
-              <a:t>2023/3/15</a:t>
+              <a:t>2023/3/16</a:t>
             </a:fld>
             <a:endParaRPr lang="zh-CN" altLang="en-US"/>
           </a:p>
@@ -2457,10 +2443,9 @@
           <a:lstStyle/>
           <a:p>
             <a:r>
-              <a:rPr lang="zh-CN" altLang="en-US" smtClean="0"/>
+              <a:rPr lang="zh-CN" altLang="en-US"/>
               <a:t>单击此处编辑母版标题样式</a:t>
             </a:r>
-            <a:endParaRPr lang="zh-CN" altLang="en-US"/>
           </a:p>
         </p:txBody>
       </p:sp>
@@ -2491,38 +2476,37 @@
           <a:p>
             <a:pPr lvl="0"/>
             <a:r>
-              <a:rPr lang="zh-CN" altLang="en-US" smtClean="0"/>
+              <a:rPr lang="zh-CN" altLang="en-US"/>
               <a:t>编辑母版文本样式</a:t>
             </a:r>
           </a:p>
           <a:p>
             <a:pPr lvl="1"/>
             <a:r>
-              <a:rPr lang="zh-CN" altLang="en-US" smtClean="0"/>
+              <a:rPr lang="zh-CN" altLang="en-US"/>
               <a:t>第二级</a:t>
             </a:r>
           </a:p>
           <a:p>
             <a:pPr lvl="2"/>
             <a:r>
-              <a:rPr lang="zh-CN" altLang="en-US" smtClean="0"/>
+              <a:rPr lang="zh-CN" altLang="en-US"/>
               <a:t>第三级</a:t>
             </a:r>
           </a:p>
           <a:p>
             <a:pPr lvl="3"/>
             <a:r>
-              <a:rPr lang="zh-CN" altLang="en-US" smtClean="0"/>
+              <a:rPr lang="zh-CN" altLang="en-US"/>
               <a:t>第四级</a:t>
             </a:r>
           </a:p>
           <a:p>
             <a:pPr lvl="4"/>
             <a:r>
-              <a:rPr lang="zh-CN" altLang="en-US" smtClean="0"/>
+              <a:rPr lang="zh-CN" altLang="en-US"/>
               <a:t>第五级</a:t>
             </a:r>
-            <a:endParaRPr lang="zh-CN" altLang="en-US"/>
           </a:p>
         </p:txBody>
       </p:sp>
@@ -2561,7 +2545,7 @@
           <a:p>
             <a:fld id="{ED707C5D-1D82-470D-8483-AF30F5141E46}" type="datetimeFigureOut">
               <a:rPr lang="zh-CN" altLang="en-US" smtClean="0"/>
-              <a:t>2023/3/15</a:t>
+              <a:t>2023/3/16</a:t>
             </a:fld>
             <a:endParaRPr lang="zh-CN" altLang="en-US"/>
           </a:p>
@@ -2982,7 +2966,7 @@
           <a:lstStyle/>
           <a:p>
             <a:r>
-              <a:rPr lang="en-US" altLang="zh-CN" dirty="0" smtClean="0"/>
+              <a:rPr lang="en-US" altLang="zh-CN" dirty="0"/>
               <a:t>Spring Boot</a:t>
             </a:r>
             <a:endParaRPr lang="zh-CN" altLang="en-US" dirty="0"/>
@@ -3042,18 +3026,18 @@
           <a:lstStyle/>
           <a:p>
             <a:r>
-              <a:rPr lang="zh-CN" altLang="en-US" b="1" u="sng" dirty="0" smtClean="0"/>
+              <a:rPr lang="zh-CN" altLang="en-US" b="1" u="sng" dirty="0"/>
               <a:t>生成</a:t>
             </a:r>
             <a:r>
-              <a:rPr lang="en-US" altLang="zh-CN" b="1" u="sng" dirty="0" err="1" smtClean="0"/>
+              <a:rPr lang="en-US" altLang="zh-CN" b="1" u="sng" dirty="0" err="1"/>
               <a:t>SpringBoot</a:t>
             </a:r>
             <a:r>
-              <a:rPr lang="zh-CN" altLang="en-US" b="1" u="sng" dirty="0" smtClean="0"/>
+              <a:rPr lang="zh-CN" altLang="en-US" b="1" u="sng" dirty="0"/>
               <a:t>项目的方式</a:t>
             </a:r>
-            <a:endParaRPr lang="en-US" altLang="zh-CN" b="1" u="sng" dirty="0" smtClean="0"/>
+            <a:endParaRPr lang="en-US" altLang="zh-CN" b="1" u="sng" dirty="0"/>
           </a:p>
         </p:txBody>
       </p:sp>
@@ -3083,12 +3067,12 @@
               <a:buAutoNum type="arabicPeriod"/>
             </a:pPr>
             <a:r>
-              <a:rPr lang="en-US" altLang="zh-CN" dirty="0" smtClean="0">
+              <a:rPr lang="en-US" altLang="zh-CN" dirty="0">
                 <a:hlinkClick r:id="rId2"/>
               </a:rPr>
               <a:t>https://start.spring.io/</a:t>
             </a:r>
-            <a:endParaRPr lang="en-US" altLang="zh-CN" dirty="0" smtClean="0"/>
+            <a:endParaRPr lang="en-US" altLang="zh-CN" dirty="0"/>
           </a:p>
           <a:p>
             <a:endParaRPr lang="en-US" altLang="zh-CN" dirty="0"/>
@@ -3160,39 +3144,136 @@
       </p:grpSpPr>
       <p:sp>
         <p:nvSpPr>
-          <p:cNvPr id="2" name="标题 1"/>
-          <p:cNvSpPr>
-            <a:spLocks noGrp="1"/>
-          </p:cNvSpPr>
-          <p:nvPr>
-            <p:ph type="title"/>
-          </p:nvPr>
-        </p:nvSpPr>
-        <p:spPr/>
-        <p:txBody>
-          <a:bodyPr/>
-          <a:lstStyle/>
-          <a:p>
-            <a:endParaRPr lang="zh-CN" altLang="en-US"/>
-          </a:p>
-        </p:txBody>
-      </p:sp>
-      <p:sp>
-        <p:nvSpPr>
-          <p:cNvPr id="3" name="内容占位符 2"/>
-          <p:cNvSpPr>
-            <a:spLocks noGrp="1"/>
-          </p:cNvSpPr>
-          <p:nvPr>
-            <p:ph idx="1"/>
-          </p:nvPr>
-        </p:nvSpPr>
-        <p:spPr/>
-        <p:txBody>
-          <a:bodyPr/>
-          <a:lstStyle/>
-          <a:p>
-            <a:endParaRPr lang="zh-CN" altLang="en-US"/>
+          <p:cNvPr id="4" name="文字方塊 3">
+            <a:extLst>
+              <a:ext uri="{FF2B5EF4-FFF2-40B4-BE49-F238E27FC236}">
+                <a16:creationId xmlns:a16="http://schemas.microsoft.com/office/drawing/2014/main" id="{5D0C3405-1BCA-4FBF-8CA9-F7A0B6DDCA0D}"/>
+              </a:ext>
+            </a:extLst>
+          </p:cNvPr>
+          <p:cNvSpPr txBox="1"/>
+          <p:nvPr/>
+        </p:nvSpPr>
+        <p:spPr>
+          <a:xfrm>
+            <a:off x="233680" y="325120"/>
+            <a:ext cx="12093375" cy="1477328"/>
+          </a:xfrm>
+          <a:prstGeom prst="rect">
+            <a:avLst/>
+          </a:prstGeom>
+          <a:noFill/>
+        </p:spPr>
+        <p:txBody>
+          <a:bodyPr wrap="none" rtlCol="0">
+            <a:spAutoFit/>
+          </a:bodyPr>
+          <a:lstStyle/>
+          <a:p>
+            <a:r>
+              <a:rPr lang="en-US" altLang="zh-CN" b="1" u="sng" dirty="0" err="1"/>
+              <a:t>SpringBoot</a:t>
+            </a:r>
+            <a:r>
+              <a:rPr lang="zh-CN" altLang="en-US" b="1" u="sng" dirty="0"/>
+              <a:t>的注解</a:t>
+            </a:r>
+            <a:endParaRPr lang="en-US" altLang="zh-CN" b="1" u="sng" dirty="0"/>
+          </a:p>
+          <a:p>
+            <a:endParaRPr lang="en-US" altLang="zh-TW" b="1" u="sng" dirty="0"/>
+          </a:p>
+          <a:p>
+            <a:r>
+              <a:rPr lang="en-US" altLang="zh-TW" dirty="0"/>
+              <a:t>	</a:t>
+            </a:r>
+            <a:r>
+              <a:rPr lang="en-US" altLang="zh-CN" dirty="0"/>
+              <a:t>1. @</a:t>
+            </a:r>
+            <a:r>
+              <a:rPr lang="en-US" altLang="zh-CN" dirty="0" err="1"/>
+              <a:t>SpringBootApplication</a:t>
+            </a:r>
+            <a:r>
+              <a:rPr lang="en-US" altLang="zh-CN" dirty="0"/>
+              <a:t> </a:t>
+            </a:r>
+            <a:r>
+              <a:rPr lang="zh-CN" altLang="en-US" dirty="0"/>
+              <a:t>開啓了</a:t>
+            </a:r>
+            <a:r>
+              <a:rPr lang="en-US" altLang="zh-CN" dirty="0"/>
+              <a:t>Spring</a:t>
+            </a:r>
+            <a:r>
+              <a:rPr lang="zh-CN" altLang="en-US" dirty="0"/>
+              <a:t>的組件掃描和</a:t>
+            </a:r>
+            <a:r>
+              <a:rPr lang="en-US" altLang="zh-CN" dirty="0"/>
+              <a:t>Spring boot</a:t>
+            </a:r>
+            <a:r>
+              <a:rPr lang="zh-CN" altLang="en-US" dirty="0"/>
+              <a:t>的自動配置功能</a:t>
+            </a:r>
+            <a:r>
+              <a:rPr lang="en-US" altLang="zh-CN" dirty="0"/>
+              <a:t>.</a:t>
+            </a:r>
+          </a:p>
+          <a:p>
+            <a:r>
+              <a:rPr lang="en-US" altLang="zh-TW" dirty="0"/>
+              <a:t>	 </a:t>
+            </a:r>
+            <a:r>
+              <a:rPr lang="en-US" altLang="zh-CN" dirty="0"/>
+              <a:t>@</a:t>
+            </a:r>
+            <a:r>
+              <a:rPr lang="en-US" altLang="zh-CN" dirty="0" err="1"/>
+              <a:t>SpringBootApplication</a:t>
+            </a:r>
+            <a:r>
+              <a:rPr lang="en-US" altLang="zh-CN" dirty="0"/>
+              <a:t> </a:t>
+            </a:r>
+            <a:r>
+              <a:rPr lang="zh-CN" altLang="en-US" dirty="0"/>
+              <a:t>將三個注解結合在了一起</a:t>
+            </a:r>
+            <a:r>
+              <a:rPr lang="en-US" altLang="zh-CN" dirty="0"/>
+              <a:t> --- @Configuration @</a:t>
+            </a:r>
+            <a:r>
+              <a:rPr lang="en-US" altLang="zh-CN" dirty="0" err="1"/>
+              <a:t>ComponentScan</a:t>
+            </a:r>
+            <a:r>
+              <a:rPr lang="en-US" altLang="zh-CN" dirty="0"/>
+              <a:t> @</a:t>
+            </a:r>
+            <a:r>
+              <a:rPr lang="en-US" altLang="zh-CN" dirty="0" err="1"/>
+              <a:t>EnableAutoConf</a:t>
+            </a:r>
+            <a:endParaRPr lang="en-US" altLang="zh-CN" dirty="0"/>
+          </a:p>
+          <a:p>
+            <a:r>
+              <a:rPr lang="en-US" altLang="zh-CN" dirty="0"/>
+              <a:t>	    </a:t>
+            </a:r>
+            <a:r>
+              <a:rPr lang="en-US" altLang="zh-CN" dirty="0" err="1"/>
+              <a:t>iguration</a:t>
+            </a:r>
+            <a:endParaRPr lang="zh-TW" altLang="en-US" dirty="0"/>
           </a:p>
         </p:txBody>
       </p:sp>

</xml_diff>